<commit_message>
changes in module 3
</commit_message>
<xml_diff>
--- a/PowerPoints/Module_3/Module3_Fundamental_of_Java_Programming.pptx
+++ b/PowerPoints/Module_3/Module3_Fundamental_of_Java_Programming.pptx
@@ -335,7 +335,7 @@
             <a:fld id="{1D8BD707-D9CF-40AE-B4C6-C98DA3205C09}" type="datetimeFigureOut">
               <a:rPr lang="en-US" smtClean="0"/>
               <a:pPr/>
-              <a:t>7/17/2022</a:t>
+              <a:t>7/23/2022</a:t>
             </a:fld>
             <a:endParaRPr lang="en-US"/>
           </a:p>
@@ -502,7 +502,7 @@
             <a:fld id="{1D8BD707-D9CF-40AE-B4C6-C98DA3205C09}" type="datetimeFigureOut">
               <a:rPr lang="en-US" smtClean="0"/>
               <a:pPr/>
-              <a:t>7/17/2022</a:t>
+              <a:t>7/23/2022</a:t>
             </a:fld>
             <a:endParaRPr lang="en-US"/>
           </a:p>
@@ -679,7 +679,7 @@
             <a:fld id="{1D8BD707-D9CF-40AE-B4C6-C98DA3205C09}" type="datetimeFigureOut">
               <a:rPr lang="en-US" smtClean="0"/>
               <a:pPr/>
-              <a:t>7/17/2022</a:t>
+              <a:t>7/23/2022</a:t>
             </a:fld>
             <a:endParaRPr lang="en-US"/>
           </a:p>
@@ -846,7 +846,7 @@
             <a:fld id="{1D8BD707-D9CF-40AE-B4C6-C98DA3205C09}" type="datetimeFigureOut">
               <a:rPr lang="en-US" smtClean="0"/>
               <a:pPr/>
-              <a:t>7/17/2022</a:t>
+              <a:t>7/23/2022</a:t>
             </a:fld>
             <a:endParaRPr lang="en-US"/>
           </a:p>
@@ -1089,7 +1089,7 @@
             <a:fld id="{1D8BD707-D9CF-40AE-B4C6-C98DA3205C09}" type="datetimeFigureOut">
               <a:rPr lang="en-US" smtClean="0"/>
               <a:pPr/>
-              <a:t>7/17/2022</a:t>
+              <a:t>7/23/2022</a:t>
             </a:fld>
             <a:endParaRPr lang="en-US"/>
           </a:p>
@@ -1374,7 +1374,7 @@
             <a:fld id="{1D8BD707-D9CF-40AE-B4C6-C98DA3205C09}" type="datetimeFigureOut">
               <a:rPr lang="en-US" smtClean="0"/>
               <a:pPr/>
-              <a:t>7/17/2022</a:t>
+              <a:t>7/23/2022</a:t>
             </a:fld>
             <a:endParaRPr lang="en-US"/>
           </a:p>
@@ -1793,7 +1793,7 @@
             <a:fld id="{1D8BD707-D9CF-40AE-B4C6-C98DA3205C09}" type="datetimeFigureOut">
               <a:rPr lang="en-US" smtClean="0"/>
               <a:pPr/>
-              <a:t>7/17/2022</a:t>
+              <a:t>7/23/2022</a:t>
             </a:fld>
             <a:endParaRPr lang="en-US"/>
           </a:p>
@@ -1908,7 +1908,7 @@
             <a:fld id="{1D8BD707-D9CF-40AE-B4C6-C98DA3205C09}" type="datetimeFigureOut">
               <a:rPr lang="en-US" smtClean="0"/>
               <a:pPr/>
-              <a:t>7/17/2022</a:t>
+              <a:t>7/23/2022</a:t>
             </a:fld>
             <a:endParaRPr lang="en-US"/>
           </a:p>
@@ -2000,7 +2000,7 @@
             <a:fld id="{1D8BD707-D9CF-40AE-B4C6-C98DA3205C09}" type="datetimeFigureOut">
               <a:rPr lang="en-US" smtClean="0"/>
               <a:pPr/>
-              <a:t>7/17/2022</a:t>
+              <a:t>7/23/2022</a:t>
             </a:fld>
             <a:endParaRPr lang="en-US"/>
           </a:p>
@@ -2274,7 +2274,7 @@
             <a:fld id="{1D8BD707-D9CF-40AE-B4C6-C98DA3205C09}" type="datetimeFigureOut">
               <a:rPr lang="en-US" smtClean="0"/>
               <a:pPr/>
-              <a:t>7/17/2022</a:t>
+              <a:t>7/23/2022</a:t>
             </a:fld>
             <a:endParaRPr lang="en-US"/>
           </a:p>
@@ -2524,7 +2524,7 @@
             <a:fld id="{1D8BD707-D9CF-40AE-B4C6-C98DA3205C09}" type="datetimeFigureOut">
               <a:rPr lang="en-US" smtClean="0"/>
               <a:pPr/>
-              <a:t>7/17/2022</a:t>
+              <a:t>7/23/2022</a:t>
             </a:fld>
             <a:endParaRPr lang="en-US"/>
           </a:p>
@@ -2734,7 +2734,7 @@
             <a:fld id="{1D8BD707-D9CF-40AE-B4C6-C98DA3205C09}" type="datetimeFigureOut">
               <a:rPr lang="en-US" smtClean="0"/>
               <a:pPr/>
-              <a:t>7/17/2022</a:t>
+              <a:t>7/23/2022</a:t>
             </a:fld>
             <a:endParaRPr lang="en-US"/>
           </a:p>
@@ -3238,27 +3238,17 @@
               <a:rPr lang="en-US" dirty="0" smtClean="0"/>
               <a:t>; </a:t>
             </a:r>
-            <a:endParaRPr lang="en-US" dirty="0" smtClean="0"/>
-          </a:p>
-          <a:p>
-            <a:r>
-              <a:rPr lang="en-US" dirty="0" smtClean="0"/>
-              <a:t>otherwise </a:t>
-            </a:r>
-            <a:r>
-              <a:rPr lang="en-US" dirty="0" smtClean="0"/>
-              <a:t>it is of type int. </a:t>
-            </a:r>
-            <a:endParaRPr lang="en-US" dirty="0" smtClean="0"/>
-          </a:p>
-          <a:p>
-            <a:r>
-              <a:rPr lang="en-US" dirty="0" smtClean="0"/>
-              <a:t>It </a:t>
-            </a:r>
-            <a:r>
-              <a:rPr lang="en-US" dirty="0" smtClean="0"/>
-              <a:t>is recommended that you use the upper case letter L because the lower case letter </a:t>
+          </a:p>
+          <a:p>
+            <a:r>
+              <a:rPr lang="en-US" dirty="0" smtClean="0"/>
+              <a:t>otherwise it is of type int. </a:t>
+            </a:r>
+          </a:p>
+          <a:p>
+            <a:r>
+              <a:rPr lang="en-US" dirty="0" smtClean="0"/>
+              <a:t>It is recommended that you use the upper case letter L because the lower case letter </a:t>
             </a:r>
             <a:r>
               <a:rPr lang="en-US" i="1" dirty="0" smtClean="0"/>
@@ -6220,21 +6210,13 @@
           <a:p>
             <a:r>
               <a:rPr lang="en-US" dirty="0" smtClean="0"/>
-              <a:t>Unicode is a universal international standard character encoding that is capable of representing most of the world's written </a:t>
-            </a:r>
-            <a:r>
-              <a:rPr lang="en-US" dirty="0" smtClean="0"/>
-              <a:t>language</a:t>
-            </a:r>
-          </a:p>
-          <a:p>
-            <a:r>
-              <a:rPr lang="en-US" dirty="0" smtClean="0"/>
-              <a:t>Before Unicode, there were many language standards</a:t>
-            </a:r>
-            <a:r>
-              <a:rPr lang="en-US" dirty="0" smtClean="0"/>
-              <a:t>:</a:t>
+              <a:t>Unicode is a universal international standard character encoding that is capable of representing most of the world's written language</a:t>
+            </a:r>
+          </a:p>
+          <a:p>
+            <a:r>
+              <a:rPr lang="en-US" dirty="0" smtClean="0"/>
+              <a:t>Before Unicode, there were many language standards:</a:t>
             </a:r>
           </a:p>
           <a:p>
@@ -6294,13 +6276,8 @@
             </a:r>
             <a:r>
               <a:rPr lang="en-US" dirty="0" smtClean="0"/>
-              <a:t>, and so on</a:t>
-            </a:r>
-            <a:r>
-              <a:rPr lang="en-US" dirty="0" smtClean="0"/>
-              <a:t>.</a:t>
-            </a:r>
-            <a:endParaRPr lang="en-US" dirty="0" smtClean="0"/>
+              <a:t>, and so on.</a:t>
+            </a:r>
           </a:p>
         </p:txBody>
       </p:sp>
@@ -6381,21 +6358,13 @@
             </a:r>
             <a:r>
               <a:rPr lang="en-US" dirty="0" smtClean="0"/>
-              <a:t>\</a:t>
-            </a:r>
-            <a:r>
-              <a:rPr lang="en-US" dirty="0" smtClean="0"/>
-              <a:t>u0000</a:t>
+              <a:t>\u0000</a:t>
             </a:r>
           </a:p>
           <a:p>
             <a:r>
               <a:rPr lang="en-US" b="1" dirty="0" smtClean="0"/>
-              <a:t>highest </a:t>
-            </a:r>
-            <a:r>
-              <a:rPr lang="en-US" b="1" dirty="0" smtClean="0"/>
-              <a:t>value:</a:t>
+              <a:t>highest value:</a:t>
             </a:r>
             <a:r>
               <a:rPr lang="en-US" dirty="0" smtClean="0"/>
@@ -6613,11 +6582,7 @@
             </a:r>
             <a:r>
               <a:rPr lang="en-US" dirty="0" smtClean="0"/>
-              <a:t> will contain a memory address of variable values because the reference types won’t store the variable value directly in </a:t>
-            </a:r>
-            <a:r>
-              <a:rPr lang="en-US" dirty="0" smtClean="0"/>
-              <a:t>memory</a:t>
+              <a:t> will contain a memory address of variable values because the reference types won’t store the variable value directly in memory</a:t>
             </a:r>
           </a:p>
           <a:p>
@@ -6702,45 +6667,13 @@
           <a:p>
             <a:r>
               <a:rPr lang="en-US" dirty="0" smtClean="0"/>
-              <a:t>Class-&gt; A </a:t>
-            </a:r>
-            <a:r>
-              <a:rPr lang="en-US" dirty="0" smtClean="0"/>
-              <a:t>class is a user-defined blueprint or prototype from which objects are </a:t>
-            </a:r>
-            <a:r>
-              <a:rPr lang="en-US" dirty="0" smtClean="0"/>
-              <a:t>created, </a:t>
-            </a:r>
-            <a:r>
-              <a:rPr lang="en-US" dirty="0" smtClean="0"/>
-              <a:t>It represents the set of </a:t>
-            </a:r>
-            <a:r>
-              <a:rPr lang="en-US" dirty="0" smtClean="0"/>
-              <a:t>methods </a:t>
-            </a:r>
-            <a:r>
-              <a:rPr lang="en-US" dirty="0" smtClean="0"/>
-              <a:t>that are common to all objects of one </a:t>
-            </a:r>
-            <a:r>
-              <a:rPr lang="en-US" dirty="0" smtClean="0"/>
-              <a:t>type.</a:t>
-            </a:r>
-          </a:p>
-          <a:p>
-            <a:r>
-              <a:rPr lang="en-US" dirty="0" smtClean="0"/>
-              <a:t>Object-&gt;  It </a:t>
-            </a:r>
-            <a:r>
-              <a:rPr lang="en-US" dirty="0" smtClean="0"/>
-              <a:t>is a basic unit of Object-Oriented Programming and represents real-life entities.  A typical Java program creates many objects, which as you know, interact by invoking </a:t>
-            </a:r>
-            <a:r>
-              <a:rPr lang="en-US" dirty="0" smtClean="0"/>
-              <a:t>methods-&gt;State, </a:t>
+              <a:t>Class-&gt; A class is a user-defined blueprint or prototype from which objects are created, It represents the set of methods that are common to all objects of one type.</a:t>
+            </a:r>
+          </a:p>
+          <a:p>
+            <a:r>
+              <a:rPr lang="en-US" dirty="0" smtClean="0"/>
+              <a:t>Object-&gt;  It is a basic unit of Object-Oriented Programming and represents real-life entities.  A typical Java program creates many objects, which as you know, interact by invoking methods-&gt;State, </a:t>
             </a:r>
             <a:r>
               <a:rPr lang="en-US" dirty="0" err="1" smtClean="0"/>
@@ -6754,13 +6687,8 @@
           <a:p>
             <a:r>
               <a:rPr lang="en-US" dirty="0" smtClean="0"/>
-              <a:t>Arrays-&gt;</a:t>
-            </a:r>
-            <a:r>
-              <a:rPr lang="en-US" dirty="0" smtClean="0"/>
-              <a:t>An array is a group of like-typed variables that are referred to by a common name</a:t>
-            </a:r>
-            <a:endParaRPr lang="en-US" dirty="0" smtClean="0"/>
+              <a:t>Arrays-&gt;An array is a group of like-typed variables that are referred to by a common name</a:t>
+            </a:r>
           </a:p>
           <a:p>
             <a:endParaRPr lang="en-US" dirty="0"/>
@@ -6840,11 +6768,7 @@
             </a:r>
             <a:r>
               <a:rPr lang="en-US" dirty="0" smtClean="0"/>
-              <a:t>(instance) of class then space is reserved in heap </a:t>
-            </a:r>
-            <a:r>
-              <a:rPr lang="en-US" dirty="0" smtClean="0"/>
-              <a:t>memory</a:t>
+              <a:t>(instance) of class then space is reserved in heap memory</a:t>
             </a:r>
           </a:p>
           <a:p>
@@ -6860,7 +6784,6 @@
               <a:rPr lang="en-US" dirty="0" smtClean="0"/>
               <a:t>= new Vehicle();</a:t>
             </a:r>
-            <a:endParaRPr lang="en-US" dirty="0" smtClean="0"/>
           </a:p>
         </p:txBody>
       </p:sp>
@@ -8665,7 +8588,15 @@
           <a:p>
             <a:r>
               <a:rPr lang="en-US" sz="2200" dirty="0" smtClean="0"/>
-              <a:t>The conversion of primitive type to reference type is called </a:t>
+              <a:t>The conversion of primitive type to reference </a:t>
+            </a:r>
+            <a:r>
+              <a:rPr lang="en-US" sz="2200" dirty="0" smtClean="0"/>
+              <a:t>type/wrapper </a:t>
+            </a:r>
+            <a:r>
+              <a:rPr lang="en-US" sz="2200" dirty="0" smtClean="0"/>
+              <a:t>is called </a:t>
             </a:r>
             <a:r>
               <a:rPr lang="en-US" sz="2200" b="1" dirty="0" err="1" smtClean="0">
@@ -8675,7 +8606,15 @@
             </a:r>
             <a:r>
               <a:rPr lang="en-US" sz="2200" dirty="0" smtClean="0"/>
-              <a:t> and the conversion of reference type to primitive type is called </a:t>
+              <a:t> and the conversion of reference </a:t>
+            </a:r>
+            <a:r>
+              <a:rPr lang="en-US" sz="2200" dirty="0" smtClean="0"/>
+              <a:t>type/wrapper </a:t>
+            </a:r>
+            <a:r>
+              <a:rPr lang="en-US" sz="2200" dirty="0" smtClean="0"/>
+              <a:t>to primitive type is called </a:t>
             </a:r>
             <a:r>
               <a:rPr lang="en-US" sz="2200" b="1" dirty="0" err="1" smtClean="0">
@@ -8689,19 +8628,96 @@
             </a:r>
           </a:p>
           <a:p>
+            <a:endParaRPr lang="en-US" sz="2200" dirty="0" smtClean="0"/>
+          </a:p>
+          <a:p>
+            <a:r>
+              <a:rPr lang="en-US" sz="2400" b="1" dirty="0" err="1" smtClean="0"/>
+              <a:t>int</a:t>
+            </a:r>
+            <a:r>
+              <a:rPr lang="en-US" sz="2400" dirty="0" smtClean="0"/>
+              <a:t> a=50</a:t>
+            </a:r>
+            <a:r>
+              <a:rPr lang="en-US" sz="2400" dirty="0" smtClean="0"/>
+              <a:t>;</a:t>
+            </a:r>
+            <a:endParaRPr lang="en-US" sz="2200" dirty="0" smtClean="0"/>
+          </a:p>
+          <a:p>
+            <a:r>
+              <a:rPr lang="en-US" sz="2400" dirty="0" smtClean="0"/>
+              <a:t>Integer a2=</a:t>
+            </a:r>
+            <a:r>
+              <a:rPr lang="en-US" sz="2400" b="1" dirty="0" smtClean="0"/>
+              <a:t>new</a:t>
+            </a:r>
+            <a:r>
+              <a:rPr lang="en-US" sz="2400" dirty="0" smtClean="0"/>
+              <a:t> Integer(a</a:t>
+            </a:r>
+            <a:r>
+              <a:rPr lang="en-US" sz="2400" dirty="0" smtClean="0"/>
+              <a:t>)</a:t>
+            </a:r>
+          </a:p>
+          <a:p>
+            <a:endParaRPr lang="en-US" sz="2400" dirty="0" smtClean="0"/>
+          </a:p>
+          <a:p>
+            <a:r>
+              <a:rPr lang="en-US" sz="2400" dirty="0" smtClean="0"/>
+              <a:t> Integer </a:t>
+            </a:r>
+            <a:r>
+              <a:rPr lang="en-US" sz="2400" dirty="0" err="1" smtClean="0"/>
+              <a:t>i</a:t>
+            </a:r>
+            <a:r>
+              <a:rPr lang="en-US" sz="2400" dirty="0" smtClean="0"/>
+              <a:t>=</a:t>
+            </a:r>
+            <a:r>
+              <a:rPr lang="en-US" sz="2400" b="1" dirty="0" smtClean="0"/>
+              <a:t>new</a:t>
+            </a:r>
+            <a:r>
+              <a:rPr lang="en-US" sz="2400" dirty="0" smtClean="0"/>
+              <a:t> Integer(50);  </a:t>
+            </a:r>
+            <a:endParaRPr lang="en-US" sz="2200" dirty="0" smtClean="0"/>
+          </a:p>
+          <a:p>
             <a:pPr fontAlgn="base">
               <a:buNone/>
             </a:pPr>
+            <a:r>
+              <a:rPr lang="en-US" sz="2400" dirty="0" smtClean="0"/>
+              <a:t> </a:t>
+            </a:r>
+            <a:r>
+              <a:rPr lang="en-US" sz="2400" dirty="0" smtClean="0"/>
+              <a:t>     </a:t>
+            </a:r>
+            <a:r>
+              <a:rPr lang="en-US" sz="2400" b="1" dirty="0" err="1" smtClean="0"/>
+              <a:t>Int</a:t>
+            </a:r>
+            <a:r>
+              <a:rPr lang="en-US" sz="2400" dirty="0" smtClean="0"/>
+              <a:t> a=</a:t>
+            </a:r>
+            <a:r>
+              <a:rPr lang="en-US" sz="2400" dirty="0" err="1" smtClean="0"/>
+              <a:t>i</a:t>
+            </a:r>
+            <a:r>
+              <a:rPr lang="en-US" sz="2400" dirty="0" smtClean="0"/>
+              <a:t>; </a:t>
+            </a:r>
             <a:endParaRPr lang="en-US" sz="2200" dirty="0" smtClean="0"/>
-          </a:p>
-          <a:p>
-            <a:pPr fontAlgn="base">
-              <a:buNone/>
-            </a:pPr>
-            <a:r>
-              <a:rPr lang="en-US" sz="2200" dirty="0" smtClean="0"/>
-              <a:t>The Java compiler applies the feature: </a:t>
-            </a:r>
           </a:p>
           <a:p>
             <a:endParaRPr lang="en-US" dirty="0"/>
@@ -8775,26 +8791,17 @@
           <a:p>
             <a:r>
               <a:rPr lang="en-US" dirty="0" err="1" smtClean="0"/>
-              <a:t>b</a:t>
-            </a:r>
-            <a:r>
-              <a:rPr lang="en-US" dirty="0" err="1" smtClean="0"/>
-              <a:t>oolean</a:t>
+              <a:t>boolean</a:t>
             </a:r>
             <a:r>
               <a:rPr lang="en-US" dirty="0" smtClean="0"/>
               <a:t>                                     Boolean</a:t>
             </a:r>
-            <a:endParaRPr lang="en-US" dirty="0" smtClean="0"/>
-          </a:p>
-          <a:p>
-            <a:r>
-              <a:rPr lang="en-US" dirty="0" smtClean="0"/>
-              <a:t>b</a:t>
-            </a:r>
-            <a:r>
-              <a:rPr lang="en-US" dirty="0" smtClean="0"/>
-              <a:t>yte                                            </a:t>
+          </a:p>
+          <a:p>
+            <a:r>
+              <a:rPr lang="en-US" dirty="0" smtClean="0"/>
+              <a:t>byte                                            </a:t>
             </a:r>
             <a:r>
               <a:rPr lang="en-US" dirty="0" err="1" smtClean="0"/>
@@ -8805,22 +8812,13 @@
           <a:p>
             <a:r>
               <a:rPr lang="en-US" dirty="0" smtClean="0"/>
-              <a:t>c</a:t>
-            </a:r>
-            <a:r>
-              <a:rPr lang="en-US" dirty="0" smtClean="0"/>
-              <a:t>har                                         Character</a:t>
-            </a:r>
-            <a:endParaRPr lang="en-US" dirty="0" smtClean="0"/>
-          </a:p>
-          <a:p>
-            <a:r>
-              <a:rPr lang="en-US" dirty="0" smtClean="0"/>
-              <a:t>float </a:t>
-            </a:r>
-            <a:r>
-              <a:rPr lang="en-US" dirty="0" smtClean="0"/>
-              <a:t>                                         </a:t>
+              <a:t>char                                         Character</a:t>
+            </a:r>
+          </a:p>
+          <a:p>
+            <a:r>
+              <a:rPr lang="en-US" dirty="0" smtClean="0"/>
+              <a:t>float                                          </a:t>
             </a:r>
             <a:r>
               <a:rPr lang="en-US" dirty="0" err="1" smtClean="0"/>
@@ -8835,22 +8833,13 @@
             </a:r>
             <a:r>
               <a:rPr lang="en-US" dirty="0" smtClean="0"/>
-              <a:t> </a:t>
-            </a:r>
-            <a:r>
-              <a:rPr lang="en-US" dirty="0" smtClean="0"/>
-              <a:t>                                            Integer</a:t>
-            </a:r>
-            <a:endParaRPr lang="en-US" dirty="0" smtClean="0"/>
-          </a:p>
-          <a:p>
-            <a:r>
-              <a:rPr lang="en-US" dirty="0" smtClean="0"/>
-              <a:t>long </a:t>
-            </a:r>
-            <a:r>
-              <a:rPr lang="en-US" dirty="0" smtClean="0"/>
-              <a:t>                                          </a:t>
+              <a:t>                                             Integer</a:t>
+            </a:r>
+          </a:p>
+          <a:p>
+            <a:r>
+              <a:rPr lang="en-US" dirty="0" smtClean="0"/>
+              <a:t>long                                           </a:t>
             </a:r>
             <a:r>
               <a:rPr lang="en-US" dirty="0" err="1" smtClean="0"/>
@@ -8861,25 +8850,13 @@
           <a:p>
             <a:r>
               <a:rPr lang="en-US" dirty="0" smtClean="0"/>
-              <a:t>s</a:t>
-            </a:r>
-            <a:r>
-              <a:rPr lang="en-US" dirty="0" smtClean="0"/>
-              <a:t>hort                                        </a:t>
-            </a:r>
-            <a:r>
-              <a:rPr lang="en-US" dirty="0" smtClean="0"/>
-              <a:t> Short</a:t>
-            </a:r>
-          </a:p>
-          <a:p>
-            <a:r>
-              <a:rPr lang="en-US" dirty="0" smtClean="0"/>
-              <a:t>d</a:t>
-            </a:r>
-            <a:r>
-              <a:rPr lang="en-US" dirty="0" smtClean="0"/>
-              <a:t>ouble                                       </a:t>
+              <a:t>short                                         Short</a:t>
+            </a:r>
+          </a:p>
+          <a:p>
+            <a:r>
+              <a:rPr lang="en-US" dirty="0" smtClean="0"/>
+              <a:t>double                                       </a:t>
             </a:r>
             <a:r>
               <a:rPr lang="en-US" dirty="0" err="1" smtClean="0"/>
@@ -9730,24 +9707,14 @@
           <a:p>
             <a:r>
               <a:rPr lang="en-US" dirty="0" smtClean="0"/>
-              <a:t>Arithmetic </a:t>
-            </a:r>
-            <a:r>
-              <a:rPr lang="en-US" dirty="0" smtClean="0"/>
-              <a:t>operators(+,-,/,%,++,--)</a:t>
-            </a:r>
-            <a:endParaRPr lang="en-US" dirty="0" smtClean="0"/>
-          </a:p>
-          <a:p>
-            <a:r>
-              <a:rPr lang="en-US" dirty="0" smtClean="0"/>
-              <a:t>Assignment </a:t>
-            </a:r>
-            <a:r>
-              <a:rPr lang="en-US" dirty="0" smtClean="0"/>
-              <a:t>operators (=)</a:t>
-            </a:r>
-            <a:endParaRPr lang="en-US" dirty="0" smtClean="0"/>
+              <a:t>Arithmetic operators(+,-,/,%,++,--)</a:t>
+            </a:r>
+          </a:p>
+          <a:p>
+            <a:r>
+              <a:rPr lang="en-US" dirty="0" smtClean="0"/>
+              <a:t>Assignment operators (=)</a:t>
+            </a:r>
           </a:p>
           <a:p>
             <a:r>
@@ -9833,11 +9800,7 @@
           <a:p>
             <a:r>
               <a:rPr lang="en-US" b="1" dirty="0" smtClean="0"/>
-              <a:t>addition </a:t>
-            </a:r>
-            <a:r>
-              <a:rPr lang="en-US" b="1" dirty="0" smtClean="0"/>
-              <a:t>assignment</a:t>
+              <a:t>addition assignment</a:t>
             </a:r>
           </a:p>
           <a:p>
@@ -10174,221 +10137,67 @@
           <a:p>
             <a:r>
               <a:rPr lang="en-US" dirty="0" smtClean="0"/>
-              <a:t>=                     </a:t>
-            </a:r>
-            <a:r>
-              <a:rPr lang="en-US" dirty="0" smtClean="0"/>
-              <a:t>x = </a:t>
-            </a:r>
-            <a:r>
-              <a:rPr lang="en-US" dirty="0" smtClean="0"/>
-              <a:t>5                                  </a:t>
-            </a:r>
-            <a:r>
-              <a:rPr lang="en-US" dirty="0" smtClean="0"/>
-              <a:t>x = 5</a:t>
-            </a:r>
-            <a:endParaRPr lang="en-US" dirty="0" smtClean="0"/>
-          </a:p>
-          <a:p>
-            <a:r>
-              <a:rPr lang="en-US" dirty="0" smtClean="0"/>
-              <a:t>+=                    </a:t>
-            </a:r>
-            <a:r>
-              <a:rPr lang="en-US" dirty="0" smtClean="0"/>
-              <a:t>x += </a:t>
-            </a:r>
-            <a:r>
-              <a:rPr lang="en-US" dirty="0" smtClean="0"/>
-              <a:t>3                             </a:t>
-            </a:r>
-            <a:r>
-              <a:rPr lang="en-US" dirty="0" smtClean="0"/>
-              <a:t>x = x + 3</a:t>
-            </a:r>
-            <a:endParaRPr lang="en-US" dirty="0" smtClean="0"/>
-          </a:p>
-          <a:p>
-            <a:r>
-              <a:rPr lang="en-US" dirty="0" smtClean="0"/>
-              <a:t>-=                    </a:t>
-            </a:r>
-            <a:r>
-              <a:rPr lang="en-US" dirty="0" smtClean="0"/>
-              <a:t>x -= </a:t>
-            </a:r>
-            <a:r>
-              <a:rPr lang="en-US" dirty="0" smtClean="0"/>
-              <a:t>3                               </a:t>
-            </a:r>
-            <a:r>
-              <a:rPr lang="en-US" dirty="0" smtClean="0"/>
-              <a:t>x = x - 3</a:t>
-            </a:r>
-            <a:endParaRPr lang="en-US" dirty="0" smtClean="0"/>
-          </a:p>
-          <a:p>
-            <a:r>
-              <a:rPr lang="en-US" dirty="0" smtClean="0"/>
-              <a:t>*=                   </a:t>
-            </a:r>
-            <a:r>
-              <a:rPr lang="en-US" dirty="0" smtClean="0"/>
-              <a:t>x *= </a:t>
-            </a:r>
-            <a:r>
-              <a:rPr lang="en-US" dirty="0" smtClean="0"/>
-              <a:t>3                              </a:t>
-            </a:r>
-            <a:r>
-              <a:rPr lang="en-US" dirty="0" smtClean="0"/>
-              <a:t>x = x * 3</a:t>
-            </a:r>
-            <a:endParaRPr lang="en-US" dirty="0" smtClean="0"/>
-          </a:p>
-          <a:p>
-            <a:r>
-              <a:rPr lang="en-US" dirty="0" smtClean="0"/>
-              <a:t>/=                    </a:t>
-            </a:r>
-            <a:r>
-              <a:rPr lang="en-US" dirty="0" smtClean="0"/>
-              <a:t>x /= 3 </a:t>
-            </a:r>
-            <a:r>
-              <a:rPr lang="en-US" dirty="0" smtClean="0"/>
-              <a:t>                             x </a:t>
-            </a:r>
-            <a:r>
-              <a:rPr lang="en-US" dirty="0" smtClean="0"/>
-              <a:t>= x / 3</a:t>
-            </a:r>
-            <a:endParaRPr lang="en-US" dirty="0" smtClean="0"/>
-          </a:p>
-          <a:p>
-            <a:r>
-              <a:rPr lang="en-US" dirty="0" smtClean="0"/>
-              <a:t>&amp;</a:t>
-            </a:r>
-            <a:r>
-              <a:rPr lang="en-US" dirty="0" smtClean="0"/>
-              <a:t>                    x </a:t>
-            </a:r>
-            <a:r>
-              <a:rPr lang="en-US" dirty="0" smtClean="0"/>
-              <a:t>&amp;= </a:t>
-            </a:r>
-            <a:r>
-              <a:rPr lang="en-US" dirty="0" smtClean="0"/>
-              <a:t>3                              </a:t>
-            </a:r>
-            <a:r>
-              <a:rPr lang="en-US" dirty="0" smtClean="0"/>
-              <a:t>x = x &amp; 3</a:t>
-            </a:r>
-            <a:endParaRPr lang="en-US" dirty="0" smtClean="0"/>
-          </a:p>
-          <a:p>
-            <a:r>
-              <a:rPr lang="en-US" dirty="0" smtClean="0"/>
-              <a:t>%=                  </a:t>
-            </a:r>
-            <a:r>
-              <a:rPr lang="en-US" dirty="0" smtClean="0"/>
-              <a:t>x %= </a:t>
-            </a:r>
-            <a:r>
-              <a:rPr lang="en-US" dirty="0" smtClean="0"/>
-              <a:t>3                             </a:t>
-            </a:r>
-            <a:r>
-              <a:rPr lang="en-US" dirty="0" smtClean="0"/>
-              <a:t>x = x % 3</a:t>
-            </a:r>
-            <a:endParaRPr lang="en-US" dirty="0" smtClean="0"/>
-          </a:p>
-          <a:p>
-            <a:r>
-              <a:rPr lang="en-US" dirty="0" smtClean="0"/>
-              <a:t>|=</a:t>
-            </a:r>
-            <a:r>
-              <a:rPr lang="en-US" dirty="0" smtClean="0"/>
-              <a:t> </a:t>
-            </a:r>
-            <a:r>
-              <a:rPr lang="en-US" dirty="0" smtClean="0"/>
-              <a:t>                  x </a:t>
-            </a:r>
-            <a:r>
-              <a:rPr lang="en-US" dirty="0" smtClean="0"/>
-              <a:t>|= </a:t>
-            </a:r>
-            <a:r>
-              <a:rPr lang="en-US" dirty="0" smtClean="0"/>
-              <a:t>3                               x </a:t>
-            </a:r>
-            <a:r>
-              <a:rPr lang="en-US" dirty="0" smtClean="0"/>
-              <a:t>= x | 3</a:t>
-            </a:r>
-            <a:endParaRPr lang="en-US" dirty="0" smtClean="0"/>
-          </a:p>
-          <a:p>
-            <a:r>
-              <a:rPr lang="en-US" dirty="0" smtClean="0"/>
-              <a:t>^=                    x </a:t>
-            </a:r>
-            <a:r>
-              <a:rPr lang="en-US" dirty="0" smtClean="0"/>
-              <a:t>^= </a:t>
-            </a:r>
-            <a:r>
-              <a:rPr lang="en-US" dirty="0" smtClean="0"/>
-              <a:t>3                             x </a:t>
-            </a:r>
-            <a:r>
-              <a:rPr lang="en-US" dirty="0" smtClean="0"/>
-              <a:t>= x ^ 3</a:t>
-            </a:r>
-            <a:endParaRPr lang="en-US" dirty="0" smtClean="0"/>
-          </a:p>
-          <a:p>
-            <a:r>
-              <a:rPr lang="en-US" dirty="0" smtClean="0"/>
-              <a:t>&gt;&gt;=                 x </a:t>
-            </a:r>
-            <a:r>
-              <a:rPr lang="en-US" dirty="0" smtClean="0"/>
-              <a:t>&gt;&gt;= </a:t>
-            </a:r>
-            <a:r>
-              <a:rPr lang="en-US" dirty="0" smtClean="0"/>
-              <a:t>3                           x </a:t>
-            </a:r>
-            <a:r>
-              <a:rPr lang="en-US" dirty="0" smtClean="0"/>
-              <a:t>= x &gt;&gt; 3</a:t>
-            </a:r>
-            <a:endParaRPr lang="en-US" dirty="0" smtClean="0"/>
-          </a:p>
-          <a:p>
-            <a:r>
-              <a:rPr lang="en-US" dirty="0" smtClean="0"/>
-              <a:t>&lt;&lt;=                </a:t>
-            </a:r>
-            <a:r>
-              <a:rPr lang="en-US" dirty="0" smtClean="0"/>
-              <a:t>x &lt;&lt;= </a:t>
-            </a:r>
-            <a:r>
-              <a:rPr lang="en-US" dirty="0" smtClean="0"/>
-              <a:t>3                            </a:t>
-            </a:r>
-            <a:r>
-              <a:rPr lang="en-US" dirty="0" smtClean="0"/>
-              <a:t>x = x &lt;&lt; 3</a:t>
+              <a:t>=                     x = 5                                  x = 5</a:t>
+            </a:r>
+          </a:p>
+          <a:p>
+            <a:r>
+              <a:rPr lang="en-US" dirty="0" smtClean="0"/>
+              <a:t>+=                    x += 3                             x = x + 3</a:t>
+            </a:r>
+          </a:p>
+          <a:p>
+            <a:r>
+              <a:rPr lang="en-US" dirty="0" smtClean="0"/>
+              <a:t>-=                    x -= 3                               x = x - 3</a:t>
+            </a:r>
+          </a:p>
+          <a:p>
+            <a:r>
+              <a:rPr lang="en-US" dirty="0" smtClean="0"/>
+              <a:t>*=                   x *= 3                              x = x * 3</a:t>
+            </a:r>
+          </a:p>
+          <a:p>
+            <a:r>
+              <a:rPr lang="en-US" dirty="0" smtClean="0"/>
+              <a:t>/=                    x /= 3                              x = x / 3</a:t>
+            </a:r>
+          </a:p>
+          <a:p>
+            <a:r>
+              <a:rPr lang="en-US" dirty="0" smtClean="0"/>
+              <a:t>&amp;                    x &amp;= 3                              x = x &amp; 3</a:t>
+            </a:r>
+          </a:p>
+          <a:p>
+            <a:r>
+              <a:rPr lang="en-US" dirty="0" smtClean="0"/>
+              <a:t>%=                  x %= 3                             x = x % 3</a:t>
+            </a:r>
+          </a:p>
+          <a:p>
+            <a:r>
+              <a:rPr lang="en-US" dirty="0" smtClean="0"/>
+              <a:t>|=                   x |= 3                               x = x | 3</a:t>
+            </a:r>
+          </a:p>
+          <a:p>
+            <a:r>
+              <a:rPr lang="en-US" dirty="0" smtClean="0"/>
+              <a:t>^=                    x ^= 3                             x = x ^ 3</a:t>
+            </a:r>
+          </a:p>
+          <a:p>
+            <a:r>
+              <a:rPr lang="en-US" dirty="0" smtClean="0"/>
+              <a:t>&gt;&gt;=                 x &gt;&gt;= 3                           x = x &gt;&gt; 3</a:t>
+            </a:r>
+          </a:p>
+          <a:p>
+            <a:r>
+              <a:rPr lang="en-US" dirty="0" smtClean="0"/>
+              <a:t>&lt;&lt;=                x &lt;&lt;= 3                            x = x &lt;&lt; 3</a:t>
             </a:r>
             <a:endParaRPr lang="en-US" dirty="0"/>
           </a:p>
@@ -10572,14 +10381,12 @@
               <a:rPr lang="en-US" dirty="0" smtClean="0"/>
               <a:t>&amp;&amp; </a:t>
             </a:r>
-            <a:endParaRPr lang="en-US" dirty="0" smtClean="0"/>
           </a:p>
           <a:p>
             <a:r>
               <a:rPr lang="en-US" dirty="0" smtClean="0"/>
               <a:t>|| </a:t>
             </a:r>
-            <a:endParaRPr lang="en-US" dirty="0" smtClean="0"/>
           </a:p>
           <a:p>
             <a:r>
@@ -11397,15 +11204,7 @@
           <a:p>
             <a:r>
               <a:rPr lang="en-US" dirty="0" smtClean="0"/>
-              <a:t>b</a:t>
-            </a:r>
-            <a:r>
-              <a:rPr lang="en-US" dirty="0" smtClean="0"/>
-              <a:t>reak </a:t>
-            </a:r>
-            <a:r>
-              <a:rPr lang="en-US" dirty="0" smtClean="0"/>
-              <a:t>, case, </a:t>
+              <a:t>break , case, </a:t>
             </a:r>
             <a:r>
               <a:rPr lang="en-US" dirty="0" err="1" smtClean="0"/>
@@ -11649,11 +11448,7 @@
           <a:p>
             <a:r>
               <a:rPr lang="en-US" dirty="0" smtClean="0"/>
-              <a:t>String </a:t>
-            </a:r>
-            <a:r>
-              <a:rPr lang="en-US" dirty="0" smtClean="0"/>
-              <a:t>Literal</a:t>
+              <a:t>String Literal</a:t>
             </a:r>
           </a:p>
           <a:p>
@@ -11661,7 +11456,6 @@
               <a:rPr lang="en-US" dirty="0" smtClean="0"/>
               <a:t>Floating Point Literal</a:t>
             </a:r>
-            <a:endParaRPr lang="en-US" dirty="0" smtClean="0"/>
           </a:p>
           <a:p>
             <a:endParaRPr lang="en-US" dirty="0"/>

</xml_diff>